<commit_message>
fix error in security testing pres files
</commit_message>
<xml_diff>
--- a/f2f/2019/01-princeton/20190201-Intel-SecurityTestingPlan.pptx
+++ b/f2f/2019/01-princeton/20190201-Intel-SecurityTestingPlan.pptx
@@ -255,7 +255,7 @@
           <a:p>
             <a:fld id="{78D41992-5058-4E47-B802-A6C9396A3636}" type="datetimeFigureOut">
               <a:rPr lang="en-US" smtClean="0"/>
-              <a:t>2019-01-31</a:t>
+              <a:t>2019-02-13</a:t>
             </a:fld>
             <a:endParaRPr lang="en-US"/>
           </a:p>
@@ -425,7 +425,7 @@
           <a:p>
             <a:fld id="{78D41992-5058-4E47-B802-A6C9396A3636}" type="datetimeFigureOut">
               <a:rPr lang="en-US" smtClean="0"/>
-              <a:t>2019-01-31</a:t>
+              <a:t>2019-02-13</a:t>
             </a:fld>
             <a:endParaRPr lang="en-US"/>
           </a:p>
@@ -605,7 +605,7 @@
           <a:p>
             <a:fld id="{78D41992-5058-4E47-B802-A6C9396A3636}" type="datetimeFigureOut">
               <a:rPr lang="en-US" smtClean="0"/>
-              <a:t>2019-01-31</a:t>
+              <a:t>2019-02-13</a:t>
             </a:fld>
             <a:endParaRPr lang="en-US"/>
           </a:p>
@@ -775,7 +775,7 @@
           <a:p>
             <a:fld id="{78D41992-5058-4E47-B802-A6C9396A3636}" type="datetimeFigureOut">
               <a:rPr lang="en-US" smtClean="0"/>
-              <a:t>2019-01-31</a:t>
+              <a:t>2019-02-13</a:t>
             </a:fld>
             <a:endParaRPr lang="en-US"/>
           </a:p>
@@ -1021,7 +1021,7 @@
           <a:p>
             <a:fld id="{78D41992-5058-4E47-B802-A6C9396A3636}" type="datetimeFigureOut">
               <a:rPr lang="en-US" smtClean="0"/>
-              <a:t>2019-01-31</a:t>
+              <a:t>2019-02-13</a:t>
             </a:fld>
             <a:endParaRPr lang="en-US"/>
           </a:p>
@@ -1253,7 +1253,7 @@
           <a:p>
             <a:fld id="{78D41992-5058-4E47-B802-A6C9396A3636}" type="datetimeFigureOut">
               <a:rPr lang="en-US" smtClean="0"/>
-              <a:t>2019-01-31</a:t>
+              <a:t>2019-02-13</a:t>
             </a:fld>
             <a:endParaRPr lang="en-US"/>
           </a:p>
@@ -1620,7 +1620,7 @@
           <a:p>
             <a:fld id="{78D41992-5058-4E47-B802-A6C9396A3636}" type="datetimeFigureOut">
               <a:rPr lang="en-US" smtClean="0"/>
-              <a:t>2019-01-31</a:t>
+              <a:t>2019-02-13</a:t>
             </a:fld>
             <a:endParaRPr lang="en-US"/>
           </a:p>
@@ -1738,7 +1738,7 @@
           <a:p>
             <a:fld id="{78D41992-5058-4E47-B802-A6C9396A3636}" type="datetimeFigureOut">
               <a:rPr lang="en-US" smtClean="0"/>
-              <a:t>2019-01-31</a:t>
+              <a:t>2019-02-13</a:t>
             </a:fld>
             <a:endParaRPr lang="en-US"/>
           </a:p>
@@ -1833,7 +1833,7 @@
           <a:p>
             <a:fld id="{78D41992-5058-4E47-B802-A6C9396A3636}" type="datetimeFigureOut">
               <a:rPr lang="en-US" smtClean="0"/>
-              <a:t>2019-01-31</a:t>
+              <a:t>2019-02-13</a:t>
             </a:fld>
             <a:endParaRPr lang="en-US"/>
           </a:p>
@@ -2110,7 +2110,7 @@
           <a:p>
             <a:fld id="{78D41992-5058-4E47-B802-A6C9396A3636}" type="datetimeFigureOut">
               <a:rPr lang="en-US" smtClean="0"/>
-              <a:t>2019-01-31</a:t>
+              <a:t>2019-02-13</a:t>
             </a:fld>
             <a:endParaRPr lang="en-US"/>
           </a:p>
@@ -2363,7 +2363,7 @@
           <a:p>
             <a:fld id="{78D41992-5058-4E47-B802-A6C9396A3636}" type="datetimeFigureOut">
               <a:rPr lang="en-US" smtClean="0"/>
-              <a:t>2019-01-31</a:t>
+              <a:t>2019-02-13</a:t>
             </a:fld>
             <a:endParaRPr lang="en-US"/>
           </a:p>
@@ -2576,7 +2576,7 @@
           <a:p>
             <a:fld id="{78D41992-5058-4E47-B802-A6C9396A3636}" type="datetimeFigureOut">
               <a:rPr lang="en-US" smtClean="0"/>
-              <a:t>2019-01-31</a:t>
+              <a:t>2019-02-13</a:t>
             </a:fld>
             <a:endParaRPr lang="en-US"/>
           </a:p>
@@ -5285,33 +5285,13 @@
             <a:pPr lvl="1"/>
             <a:r>
               <a:rPr lang="en-US" dirty="0" smtClean="0"/>
-              <a:t>Example MQTT tools: ?</a:t>
-            </a:r>
-          </a:p>
-          <a:p>
-            <a:r>
-              <a:rPr lang="en-US" b="1" dirty="0" smtClean="0"/>
-              <a:t>Protocol Analysis:</a:t>
-            </a:r>
-            <a:r>
-              <a:rPr lang="en-US" dirty="0" smtClean="0"/>
-              <a:t> Look at data on wire, look for misconfigured headers, etc.  Often manual, but some scripted tools available.</a:t>
-            </a:r>
-          </a:p>
-          <a:p>
-            <a:pPr lvl="1"/>
-            <a:r>
-              <a:rPr lang="en-US" dirty="0" smtClean="0"/>
-              <a:t>Example tools: Wireshark, </a:t>
-            </a:r>
-            <a:r>
-              <a:rPr lang="en-US" dirty="0" err="1" smtClean="0"/>
-              <a:t>tcpdump</a:t>
-            </a:r>
-            <a:r>
-              <a:rPr lang="en-US" dirty="0" smtClean="0"/>
-              <a:t>.</a:t>
-            </a:r>
+              <a:t>Example MQTT tools: </a:t>
+            </a:r>
+            <a:r>
+              <a:rPr lang="en-US" dirty="0" smtClean="0"/>
+              <a:t>?</a:t>
+            </a:r>
+            <a:endParaRPr lang="en-US" dirty="0" smtClean="0"/>
           </a:p>
         </p:txBody>
       </p:sp>

</xml_diff>